<commit_message>
Update Communication between microservices-補充.pptx
</commit_message>
<xml_diff>
--- a/Communication between microservices-補充.pptx
+++ b/Communication between microservices-補充.pptx
@@ -509,6 +509,94 @@
           <a:p>
             <a:r>
               <a:rPr lang="en-US" altLang="zh-TW" dirty="0"/>
+              <a:t>https://learn.microsoft.com/en-us/dotnet/architecture/microservices/multi-container-microservice-net-applications/integration-event-based-microservice-communications</a:t>
+            </a:r>
+            <a:endParaRPr lang="zh-TW" altLang="en-US" dirty="0"/>
+          </a:p>
+        </p:txBody>
+      </p:sp>
+      <p:sp>
+        <p:nvSpPr>
+          <p:cNvPr id="4" name="投影片編號版面配置區 3"/>
+          <p:cNvSpPr>
+            <a:spLocks noGrp="1"/>
+          </p:cNvSpPr>
+          <p:nvPr>
+            <p:ph type="sldNum" sz="quarter" idx="5"/>
+          </p:nvPr>
+        </p:nvSpPr>
+        <p:spPr/>
+        <p:txBody>
+          <a:bodyPr/>
+          <a:lstStyle/>
+          <a:p>
+            <a:fld id="{E6F55C04-2218-4761-8199-136C9AFFA2A3}" type="slidenum">
+              <a:rPr lang="zh-TW" altLang="en-US" smtClean="0"/>
+              <a:t>2</a:t>
+            </a:fld>
+            <a:endParaRPr lang="zh-TW" altLang="en-US"/>
+          </a:p>
+        </p:txBody>
+      </p:sp>
+    </p:spTree>
+    <p:extLst>
+      <p:ext uri="{BB962C8B-B14F-4D97-AF65-F5344CB8AC3E}">
+        <p14:creationId xmlns:p14="http://schemas.microsoft.com/office/powerpoint/2010/main" val="3696735567"/>
+      </p:ext>
+    </p:extLst>
+  </p:cSld>
+  <p:clrMapOvr>
+    <a:masterClrMapping/>
+  </p:clrMapOvr>
+</p:notes>
+</file>
+
+<file path=ppt/notesSlides/notesSlide2.xml><?xml version="1.0" encoding="utf-8"?>
+<p:notes xmlns:a="http://schemas.openxmlformats.org/drawingml/2006/main" xmlns:r="http://schemas.openxmlformats.org/officeDocument/2006/relationships" xmlns:p="http://schemas.openxmlformats.org/presentationml/2006/main">
+  <p:cSld>
+    <p:spTree>
+      <p:nvGrpSpPr>
+        <p:cNvPr id="1" name=""/>
+        <p:cNvGrpSpPr/>
+        <p:nvPr/>
+      </p:nvGrpSpPr>
+      <p:grpSpPr>
+        <a:xfrm>
+          <a:off x="0" y="0"/>
+          <a:ext cx="0" cy="0"/>
+          <a:chOff x="0" y="0"/>
+          <a:chExt cx="0" cy="0"/>
+        </a:xfrm>
+      </p:grpSpPr>
+      <p:sp>
+        <p:nvSpPr>
+          <p:cNvPr id="2" name="投影片影像版面配置區 1"/>
+          <p:cNvSpPr>
+            <a:spLocks noGrp="1" noRot="1" noChangeAspect="1"/>
+          </p:cNvSpPr>
+          <p:nvPr>
+            <p:ph type="sldImg"/>
+          </p:nvPr>
+        </p:nvSpPr>
+        <p:spPr/>
+      </p:sp>
+      <p:sp>
+        <p:nvSpPr>
+          <p:cNvPr id="3" name="備忘稿版面配置區 2"/>
+          <p:cNvSpPr>
+            <a:spLocks noGrp="1"/>
+          </p:cNvSpPr>
+          <p:nvPr>
+            <p:ph type="body" idx="1"/>
+          </p:nvPr>
+        </p:nvSpPr>
+        <p:spPr/>
+        <p:txBody>
+          <a:bodyPr/>
+          <a:lstStyle/>
+          <a:p>
+            <a:r>
+              <a:rPr lang="en-US" altLang="zh-TW" dirty="0"/>
               <a:t>https://www.upsolver.com/blog/cqrs-event-sourcing-build-database-architecture</a:t>
             </a:r>
             <a:endParaRPr lang="zh-TW" altLang="en-US" dirty="0"/>
@@ -551,7 +639,7 @@
 </p:notes>
 </file>
 
-<file path=ppt/notesSlides/notesSlide2.xml><?xml version="1.0" encoding="utf-8"?>
+<file path=ppt/notesSlides/notesSlide3.xml><?xml version="1.0" encoding="utf-8"?>
 <p:notes xmlns:a="http://schemas.openxmlformats.org/drawingml/2006/main" xmlns:r="http://schemas.openxmlformats.org/officeDocument/2006/relationships" xmlns:p="http://schemas.openxmlformats.org/presentationml/2006/main">
   <p:cSld>
     <p:spTree>
@@ -4050,7 +4138,7 @@
           <p:nvPr/>
         </p:nvPicPr>
         <p:blipFill>
-          <a:blip r:embed="rId2">
+          <a:blip r:embed="rId3">
             <a:extLst>
               <a:ext uri="{28A0092B-C50C-407E-A947-70E740481C1C}">
                 <a14:useLocalDpi xmlns:a14="http://schemas.microsoft.com/office/drawing/2010/main" val="0"/>

</xml_diff>